<commit_message>
Updated demo img plus resources update.
</commit_message>
<xml_diff>
--- a/enterprise-grade-deployment-2019.pptx
+++ b/enterprise-grade-deployment-2019.pptx
@@ -27708,7 +27708,7 @@
           <a:graphicData uri="http://schemas.openxmlformats.org/presentationml/2006/ole">
             <mc:AlternateContent xmlns:mc="http://schemas.openxmlformats.org/markup-compatibility/2006">
               <mc:Choice xmlns:v="urn:schemas-microsoft-com:vml" Requires="v">
-                <p:oleObj spid="_x0000_s92283" name="Diapositive think-cell" r:id="rId5" imgW="421" imgH="423" progId="TCLayout.ActiveDocument.1">
+                <p:oleObj spid="_x0000_s92290" name="Diapositive think-cell" r:id="rId5" imgW="421" imgH="423" progId="TCLayout.ActiveDocument.1">
                   <p:embed/>
                 </p:oleObj>
               </mc:Choice>
@@ -28307,7 +28307,7 @@
           <a:graphicData uri="http://schemas.openxmlformats.org/presentationml/2006/ole">
             <mc:AlternateContent xmlns:mc="http://schemas.openxmlformats.org/markup-compatibility/2006">
               <mc:Choice xmlns:v="urn:schemas-microsoft-com:vml" Requires="v">
-                <p:oleObj spid="_x0000_s143403" name="Diapositive think-cell" r:id="rId6" imgW="421" imgH="423" progId="TCLayout.ActiveDocument.1">
+                <p:oleObj spid="_x0000_s143410" name="Diapositive think-cell" r:id="rId6" imgW="421" imgH="423" progId="TCLayout.ActiveDocument.1">
                   <p:embed/>
                 </p:oleObj>
               </mc:Choice>
@@ -29622,24 +29622,31 @@
           </a:p>
         </p:txBody>
       </p:sp>
-      <p:sp>
-        <p:nvSpPr>
-          <p:cNvPr id="3" name="Picture Placeholder 2">
+      <p:pic>
+        <p:nvPicPr>
+          <p:cNvPr id="5" name="Picture Placeholder 4" descr="A picture containing person, indoor, wheel, object&#10;&#10;Description automatically generated">
             <a:extLst>
               <a:ext uri="{FF2B5EF4-FFF2-40B4-BE49-F238E27FC236}">
-                <a16:creationId xmlns:a16="http://schemas.microsoft.com/office/drawing/2014/main" id="{171C3E3E-4E95-456F-A10B-8BEA14C1C4CD}"/>
+                <a16:creationId xmlns:a16="http://schemas.microsoft.com/office/drawing/2014/main" id="{31511718-F181-475B-890C-02C49DC5B047}"/>
               </a:ext>
             </a:extLst>
           </p:cNvPr>
-          <p:cNvSpPr>
-            <a:spLocks noGrp="1"/>
-          </p:cNvSpPr>
+          <p:cNvPicPr>
+            <a:picLocks noGrp="1" noChangeAspect="1"/>
+          </p:cNvPicPr>
           <p:nvPr>
             <p:ph type="pic" idx="1"/>
           </p:nvPr>
-        </p:nvSpPr>
+        </p:nvPicPr>
+        <p:blipFill>
+          <a:blip r:embed="rId2"/>
+          <a:srcRect l="22972" r="22972"/>
+          <a:stretch>
+            <a:fillRect/>
+          </a:stretch>
+        </p:blipFill>
         <p:spPr/>
-      </p:sp>
+      </p:pic>
     </p:spTree>
     <p:extLst>
       <p:ext uri="{BB962C8B-B14F-4D97-AF65-F5344CB8AC3E}">
@@ -29690,7 +29697,7 @@
           <a:graphicData uri="http://schemas.openxmlformats.org/presentationml/2006/ole">
             <mc:AlternateContent xmlns:mc="http://schemas.openxmlformats.org/markup-compatibility/2006">
               <mc:Choice xmlns:v="urn:schemas-microsoft-com:vml" Requires="v">
-                <p:oleObj spid="_x0000_s47232" name="Diapositive think-cell" r:id="rId5" imgW="421" imgH="423" progId="TCLayout.ActiveDocument.1">
+                <p:oleObj spid="_x0000_s47239" name="Diapositive think-cell" r:id="rId5" imgW="421" imgH="423" progId="TCLayout.ActiveDocument.1">
                   <p:embed/>
                 </p:oleObj>
               </mc:Choice>
@@ -31149,6 +31156,42 @@
             </a:r>
             <a:endParaRPr lang="en-US" dirty="0"/>
           </a:p>
+          <a:p>
+            <a:r>
+              <a:rPr lang="en-US" dirty="0">
+                <a:hlinkClick r:id="rId8"/>
+              </a:rPr>
+              <a:t>https://pixabay.com/photos/hands-clay-potter-pottery-1139098/</a:t>
+            </a:r>
+            <a:endParaRPr lang="en-US" dirty="0"/>
+          </a:p>
+          <a:p>
+            <a:r>
+              <a:rPr lang="en-US" dirty="0">
+                <a:hlinkClick r:id="rId9"/>
+              </a:rPr>
+              <a:t>https://www.redhat.com/en/topics/microservices/what-are-microservices</a:t>
+            </a:r>
+            <a:endParaRPr lang="en-US" dirty="0"/>
+          </a:p>
+          <a:p>
+            <a:r>
+              <a:rPr lang="en-US" dirty="0">
+                <a:hlinkClick r:id="rId10"/>
+              </a:rPr>
+              <a:t>https://github.com/vaquarkhan/vaquarkhan/wiki/Difference-between-scaling-horizontally-and-vertically</a:t>
+            </a:r>
+            <a:endParaRPr lang="en-US" dirty="0"/>
+          </a:p>
+          <a:p>
+            <a:r>
+              <a:rPr lang="en-US" dirty="0">
+                <a:hlinkClick r:id="rId11"/>
+              </a:rPr>
+              <a:t>https://svitla.com/blog/kubernetes-vs-docker</a:t>
+            </a:r>
+            <a:endParaRPr lang="en-US" dirty="0"/>
+          </a:p>
         </p:txBody>
       </p:sp>
     </p:spTree>
@@ -31611,7 +31654,7 @@
           <a:graphicData uri="http://schemas.openxmlformats.org/presentationml/2006/ole">
             <mc:AlternateContent xmlns:mc="http://schemas.openxmlformats.org/markup-compatibility/2006">
               <mc:Choice xmlns:v="urn:schemas-microsoft-com:vml" Requires="v">
-                <p:oleObj spid="_x0000_s141362" name="Diapositive think-cell" r:id="rId6" imgW="421" imgH="423" progId="TCLayout.ActiveDocument.1">
+                <p:oleObj spid="_x0000_s141369" name="Diapositive think-cell" r:id="rId6" imgW="421" imgH="423" progId="TCLayout.ActiveDocument.1">
                   <p:embed/>
                 </p:oleObj>
               </mc:Choice>
@@ -32287,7 +32330,7 @@
           <a:graphicData uri="http://schemas.openxmlformats.org/presentationml/2006/ole">
             <mc:AlternateContent xmlns:mc="http://schemas.openxmlformats.org/markup-compatibility/2006">
               <mc:Choice xmlns:v="urn:schemas-microsoft-com:vml" Requires="v">
-                <p:oleObj spid="_x0000_s142380" name="Diapositive think-cell" r:id="rId6" imgW="421" imgH="423" progId="TCLayout.ActiveDocument.1">
+                <p:oleObj spid="_x0000_s142387" name="Diapositive think-cell" r:id="rId6" imgW="421" imgH="423" progId="TCLayout.ActiveDocument.1">
                   <p:embed/>
                 </p:oleObj>
               </mc:Choice>
@@ -33303,9 +33346,12 @@
 </file>
 
 <file path=customXml/item1.xml><?xml version="1.0" encoding="utf-8"?>
-<p:properties xmlns:p="http://schemas.microsoft.com/office/2006/metadata/properties" xmlns:xsi="http://www.w3.org/2001/XMLSchema-instance" xmlns:pc="http://schemas.microsoft.com/office/infopath/2007/PartnerControls">
-  <documentManagement/>
-</p:properties>
+<?mso-contentType ?>
+<FormTemplates xmlns="http://schemas.microsoft.com/sharepoint/v3/contenttype/forms">
+  <Display>DocumentLibraryForm</Display>
+  <Edit>DocumentLibraryForm</Edit>
+  <New>DocumentLibraryForm</New>
+</FormTemplates>
 </file>
 
 <file path=customXml/item2.xml><?xml version="1.0" encoding="utf-8"?>
@@ -33473,26 +33519,15 @@
 </file>
 
 <file path=customXml/item3.xml><?xml version="1.0" encoding="utf-8"?>
-<?mso-contentType ?>
-<FormTemplates xmlns="http://schemas.microsoft.com/sharepoint/v3/contenttype/forms">
-  <Display>DocumentLibraryForm</Display>
-  <Edit>DocumentLibraryForm</Edit>
-  <New>DocumentLibraryForm</New>
-</FormTemplates>
+<p:properties xmlns:p="http://schemas.microsoft.com/office/2006/metadata/properties" xmlns:xsi="http://www.w3.org/2001/XMLSchema-instance" xmlns:pc="http://schemas.microsoft.com/office/infopath/2007/PartnerControls">
+  <documentManagement/>
+</p:properties>
 </file>
 
 <file path=customXml/itemProps1.xml><?xml version="1.0" encoding="utf-8"?>
-<ds:datastoreItem xmlns:ds="http://schemas.openxmlformats.org/officeDocument/2006/customXml" ds:itemID="{9482C44C-A80D-4577-ACF3-68366839A07A}">
+<ds:datastoreItem xmlns:ds="http://schemas.openxmlformats.org/officeDocument/2006/customXml" ds:itemID="{71F5EAB3-8807-4C45-B064-2A4F9EB2E2DA}">
   <ds:schemaRefs>
-    <ds:schemaRef ds:uri="http://purl.org/dc/terms/"/>
-    <ds:schemaRef ds:uri="http://schemas.openxmlformats.org/package/2006/metadata/core-properties"/>
-    <ds:schemaRef ds:uri="http://schemas.microsoft.com/office/2006/documentManagement/types"/>
-    <ds:schemaRef ds:uri="http://schemas.microsoft.com/office/infopath/2007/PartnerControls"/>
-    <ds:schemaRef ds:uri="http://purl.org/dc/elements/1.1/"/>
-    <ds:schemaRef ds:uri="http://schemas.microsoft.com/office/2006/metadata/properties"/>
-    <ds:schemaRef ds:uri="b7cf5ea5-dbd4-4264-9cbd-1657fe4f88b3"/>
-    <ds:schemaRef ds:uri="http://www.w3.org/XML/1998/namespace"/>
-    <ds:schemaRef ds:uri="http://purl.org/dc/dcmitype/"/>
+    <ds:schemaRef ds:uri="http://schemas.microsoft.com/sharepoint/v3/contenttype/forms"/>
   </ds:schemaRefs>
 </ds:datastoreItem>
 </file>
@@ -33516,9 +33551,17 @@
 </file>
 
 <file path=customXml/itemProps3.xml><?xml version="1.0" encoding="utf-8"?>
-<ds:datastoreItem xmlns:ds="http://schemas.openxmlformats.org/officeDocument/2006/customXml" ds:itemID="{71F5EAB3-8807-4C45-B064-2A4F9EB2E2DA}">
+<ds:datastoreItem xmlns:ds="http://schemas.openxmlformats.org/officeDocument/2006/customXml" ds:itemID="{9482C44C-A80D-4577-ACF3-68366839A07A}">
   <ds:schemaRefs>
-    <ds:schemaRef ds:uri="http://schemas.microsoft.com/sharepoint/v3/contenttype/forms"/>
+    <ds:schemaRef ds:uri="http://purl.org/dc/terms/"/>
+    <ds:schemaRef ds:uri="http://schemas.openxmlformats.org/package/2006/metadata/core-properties"/>
+    <ds:schemaRef ds:uri="http://schemas.microsoft.com/office/2006/documentManagement/types"/>
+    <ds:schemaRef ds:uri="http://schemas.microsoft.com/office/infopath/2007/PartnerControls"/>
+    <ds:schemaRef ds:uri="http://purl.org/dc/elements/1.1/"/>
+    <ds:schemaRef ds:uri="http://schemas.microsoft.com/office/2006/metadata/properties"/>
+    <ds:schemaRef ds:uri="b7cf5ea5-dbd4-4264-9cbd-1657fe4f88b3"/>
+    <ds:schemaRef ds:uri="http://www.w3.org/XML/1998/namespace"/>
+    <ds:schemaRef ds:uri="http://purl.org/dc/dcmitype/"/>
   </ds:schemaRefs>
 </ds:datastoreItem>
 </file>
</xml_diff>